<commit_message>
updated media views and comments
</commit_message>
<xml_diff>
--- a/assets/imgs/pitch.pptx
+++ b/assets/imgs/pitch.pptx
@@ -11,8 +11,11 @@
     <p:sldId id="259" r:id="rId5"/>
     <p:sldId id="260" r:id="rId6"/>
     <p:sldId id="262" r:id="rId7"/>
-    <p:sldId id="261" r:id="rId8"/>
-    <p:sldId id="263" r:id="rId9"/>
+    <p:sldId id="264" r:id="rId8"/>
+    <p:sldId id="265" r:id="rId9"/>
+    <p:sldId id="261" r:id="rId10"/>
+    <p:sldId id="263" r:id="rId11"/>
+    <p:sldId id="266" r:id="rId12"/>
   </p:sldIdLst>
   <p:sldSz cx="12192000" cy="6858000"/>
   <p:notesSz cx="6858000" cy="9144000"/>
@@ -111,6 +114,11 @@
       </a:defRPr>
     </a:lvl9pPr>
   </p:defaultTextStyle>
+  <p:extLst>
+    <p:ext uri="{EFAFB233-063F-42B5-8137-9DF3F51BA10A}">
+      <p15:sldGuideLst xmlns:p15="http://schemas.microsoft.com/office/powerpoint/2012/main"/>
+    </p:ext>
+  </p:extLst>
 </p:presentation>
 </file>
 
@@ -450,7 +458,7 @@
             <a:fld id="{5923F103-BC34-4FE4-A40E-EDDEECFDA5D0}" type="datetimeFigureOut">
               <a:rPr lang="en-US" dirty="0"/>
               <a:pPr/>
-              <a:t>7/11/22</a:t>
+              <a:t>7/13/22</a:t>
             </a:fld>
             <a:endParaRPr lang="en-US" dirty="0"/>
           </a:p>
@@ -1534,7 +1542,7 @@
           <a:p>
             <a:fld id="{923A1CC3-2375-41D4-9E03-427CAF2A4C1A}" type="datetimeFigureOut">
               <a:rPr lang="en-US" dirty="0"/>
-              <a:t>7/11/22</a:t>
+              <a:t>7/13/22</a:t>
             </a:fld>
             <a:endParaRPr lang="en-US" dirty="0"/>
           </a:p>
@@ -2510,7 +2518,7 @@
           <a:p>
             <a:fld id="{AFF16868-8199-4C2C-A5B1-63AEE139F88E}" type="datetimeFigureOut">
               <a:rPr lang="en-US" dirty="0"/>
-              <a:t>7/11/22</a:t>
+              <a:t>7/13/22</a:t>
             </a:fld>
             <a:endParaRPr lang="en-US" dirty="0"/>
           </a:p>
@@ -3640,7 +3648,7 @@
           <a:p>
             <a:fld id="{AAD9FF7F-6988-44CC-821B-644E70CD2F73}" type="datetimeFigureOut">
               <a:rPr lang="en-US" dirty="0"/>
-              <a:t>7/11/22</a:t>
+              <a:t>7/13/22</a:t>
             </a:fld>
             <a:endParaRPr lang="en-US" dirty="0"/>
           </a:p>
@@ -4669,7 +4677,7 @@
           <a:p>
             <a:fld id="{5C12C299-16B2-4475-990D-751901EACC14}" type="datetimeFigureOut">
               <a:rPr lang="en-US" dirty="0"/>
-              <a:t>7/11/22</a:t>
+              <a:t>7/13/22</a:t>
             </a:fld>
             <a:endParaRPr lang="en-US" dirty="0"/>
           </a:p>
@@ -5325,7 +5333,7 @@
           <a:p>
             <a:fld id="{9FE86839-B9D8-4651-8783-F325ECE74E65}" type="datetimeFigureOut">
               <a:rPr lang="en-US" dirty="0"/>
-              <a:t>7/11/22</a:t>
+              <a:t>7/13/22</a:t>
             </a:fld>
             <a:endParaRPr lang="en-US" dirty="0"/>
           </a:p>
@@ -6182,7 +6190,7 @@
           <a:p>
             <a:fld id="{FD484F64-32F6-45C5-931F-ADC1662401D0}" type="datetimeFigureOut">
               <a:rPr lang="en-US" dirty="0"/>
-              <a:t>7/11/22</a:t>
+              <a:t>7/13/22</a:t>
             </a:fld>
             <a:endParaRPr lang="en-US" dirty="0"/>
           </a:p>
@@ -6368,7 +6376,7 @@
           <a:p>
             <a:fld id="{53086D93-FCAC-47E0-A2EE-787E62CA814C}" type="datetimeFigureOut">
               <a:rPr lang="en-US" dirty="0"/>
-              <a:t>7/11/22</a:t>
+              <a:t>7/13/22</a:t>
             </a:fld>
             <a:endParaRPr lang="en-US" dirty="0"/>
           </a:p>
@@ -7336,7 +7344,7 @@
           <a:p>
             <a:fld id="{CDA879A6-0FD0-4734-A311-86BFCA472E6E}" type="datetimeFigureOut">
               <a:rPr lang="en-US" dirty="0"/>
-              <a:t>7/11/22</a:t>
+              <a:t>7/13/22</a:t>
             </a:fld>
             <a:endParaRPr lang="en-US" dirty="0"/>
           </a:p>
@@ -7543,7 +7551,7 @@
           <a:p>
             <a:fld id="{19C9CA7B-DFD4-44B5-8C60-D14B8CD1FB59}" type="datetimeFigureOut">
               <a:rPr lang="en-US" dirty="0"/>
-              <a:t>7/11/22</a:t>
+              <a:t>7/13/22</a:t>
             </a:fld>
             <a:endParaRPr lang="en-US" dirty="0"/>
           </a:p>
@@ -8573,7 +8581,7 @@
           <a:p>
             <a:fld id="{F34E6425-0181-43F2-84FC-787E803FD2F8}" type="datetimeFigureOut">
               <a:rPr lang="en-US" dirty="0"/>
-              <a:t>7/11/22</a:t>
+              <a:t>7/13/22</a:t>
             </a:fld>
             <a:endParaRPr lang="en-US" dirty="0"/>
           </a:p>
@@ -8841,7 +8849,7 @@
           <a:p>
             <a:fld id="{3BDB8791-F1B0-41E7-B7FD-A781E65C4266}" type="datetimeFigureOut">
               <a:rPr lang="en-US" dirty="0"/>
-              <a:t>7/11/22</a:t>
+              <a:t>7/13/22</a:t>
             </a:fld>
             <a:endParaRPr lang="en-US" dirty="0"/>
           </a:p>
@@ -9247,7 +9255,7 @@
           <a:p>
             <a:fld id="{5FDD63B2-E120-4ED8-B27B-C685F510A5FE}" type="datetimeFigureOut">
               <a:rPr lang="en-US" dirty="0"/>
-              <a:t>7/11/22</a:t>
+              <a:t>7/13/22</a:t>
             </a:fld>
             <a:endParaRPr lang="en-US" dirty="0"/>
           </a:p>
@@ -9370,7 +9378,7 @@
           <a:p>
             <a:fld id="{7AA18ACC-A947-437B-A130-35BD54FDF1E9}" type="datetimeFigureOut">
               <a:rPr lang="en-US" dirty="0"/>
-              <a:t>7/11/22</a:t>
+              <a:t>7/13/22</a:t>
             </a:fld>
             <a:endParaRPr lang="en-US" dirty="0"/>
           </a:p>
@@ -9461,7 +9469,7 @@
           <a:p>
             <a:fld id="{7C8D7E02-BCB8-4D50-A234-369438C08659}" type="datetimeFigureOut">
               <a:rPr lang="en-US" dirty="0"/>
-              <a:t>7/11/22</a:t>
+              <a:t>7/13/22</a:t>
             </a:fld>
             <a:endParaRPr lang="en-US" dirty="0"/>
           </a:p>
@@ -10538,7 +10546,7 @@
           <a:p>
             <a:fld id="{76E86A4C-8E40-4F87-A4F0-01A0687C5742}" type="datetimeFigureOut">
               <a:rPr lang="en-US" dirty="0"/>
-              <a:t>7/11/22</a:t>
+              <a:t>7/13/22</a:t>
             </a:fld>
             <a:endParaRPr lang="en-US" dirty="0"/>
           </a:p>
@@ -11642,7 +11650,7 @@
           <a:p>
             <a:fld id="{35E72C73-2D91-4E12-BA25-F0AA0C03599B}" type="datetimeFigureOut">
               <a:rPr lang="en-US" dirty="0"/>
-              <a:t>7/11/22</a:t>
+              <a:t>7/13/22</a:t>
             </a:fld>
             <a:endParaRPr lang="en-US" dirty="0"/>
           </a:p>
@@ -12635,7 +12643,7 @@
           <a:p>
             <a:fld id="{2BE451C3-0FF4-47C4-B829-773ADF60F88C}" type="datetimeFigureOut">
               <a:rPr lang="en-US" dirty="0"/>
-              <a:t>7/11/22</a:t>
+              <a:t>7/13/22</a:t>
             </a:fld>
             <a:endParaRPr lang="en-US" dirty="0"/>
           </a:p>
@@ -13252,7 +13260,7 @@
           <a:p>
             <a:r>
               <a:rPr lang="en-US" dirty="0"/>
-              <a:t>Team Git-IT: Noah Parker, CHRIS BURNSIDE, Andrew GETTZ </a:t>
+              <a:t>Team TURING: Noah Parker, CHRIS BURNSIDE, Andrew GETTZ </a:t>
             </a:r>
           </a:p>
         </p:txBody>
@@ -13261,6 +13269,201 @@
     <p:extLst>
       <p:ext uri="{BB962C8B-B14F-4D97-AF65-F5344CB8AC3E}">
         <p14:creationId xmlns:p14="http://schemas.microsoft.com/office/powerpoint/2010/main" val="1452265738"/>
+      </p:ext>
+    </p:extLst>
+  </p:cSld>
+  <p:clrMapOvr>
+    <a:masterClrMapping/>
+  </p:clrMapOvr>
+</p:sld>
+</file>
+
+<file path=ppt/slides/slide10.xml><?xml version="1.0" encoding="utf-8"?>
+<p:sld xmlns:a="http://schemas.openxmlformats.org/drawingml/2006/main" xmlns:r="http://schemas.openxmlformats.org/officeDocument/2006/relationships" xmlns:p="http://schemas.openxmlformats.org/presentationml/2006/main">
+  <p:cSld>
+    <p:spTree>
+      <p:nvGrpSpPr>
+        <p:cNvPr id="1" name=""/>
+        <p:cNvGrpSpPr/>
+        <p:nvPr/>
+      </p:nvGrpSpPr>
+      <p:grpSpPr>
+        <a:xfrm>
+          <a:off x="0" y="0"/>
+          <a:ext cx="0" cy="0"/>
+          <a:chOff x="0" y="0"/>
+          <a:chExt cx="0" cy="0"/>
+        </a:xfrm>
+      </p:grpSpPr>
+      <p:sp>
+        <p:nvSpPr>
+          <p:cNvPr id="2" name="Title 1">
+            <a:extLst>
+              <a:ext uri="{FF2B5EF4-FFF2-40B4-BE49-F238E27FC236}">
+                <a16:creationId xmlns:a16="http://schemas.microsoft.com/office/drawing/2014/main" id="{E726FAA5-6E55-7076-24A5-3C70992FDBFD}"/>
+              </a:ext>
+            </a:extLst>
+          </p:cNvPr>
+          <p:cNvSpPr>
+            <a:spLocks noGrp="1"/>
+          </p:cNvSpPr>
+          <p:nvPr>
+            <p:ph type="title"/>
+          </p:nvPr>
+        </p:nvSpPr>
+        <p:spPr/>
+        <p:txBody>
+          <a:bodyPr/>
+          <a:lstStyle/>
+          <a:p>
+            <a:r>
+              <a:rPr lang="en-US" dirty="0"/>
+              <a:t>Links </a:t>
+            </a:r>
+          </a:p>
+        </p:txBody>
+      </p:sp>
+      <p:sp>
+        <p:nvSpPr>
+          <p:cNvPr id="3" name="Content Placeholder 2">
+            <a:extLst>
+              <a:ext uri="{FF2B5EF4-FFF2-40B4-BE49-F238E27FC236}">
+                <a16:creationId xmlns:a16="http://schemas.microsoft.com/office/drawing/2014/main" id="{AF2683F6-26D8-FFDB-6C9E-F83EDA87098E}"/>
+              </a:ext>
+            </a:extLst>
+          </p:cNvPr>
+          <p:cNvSpPr>
+            <a:spLocks noGrp="1"/>
+          </p:cNvSpPr>
+          <p:nvPr>
+            <p:ph idx="1"/>
+          </p:nvPr>
+        </p:nvSpPr>
+        <p:spPr/>
+        <p:txBody>
+          <a:bodyPr/>
+          <a:lstStyle/>
+          <a:p>
+            <a:r>
+              <a:rPr lang="en-US" dirty="0">
+                <a:hlinkClick r:id="rId2"/>
+              </a:rPr>
+              <a:t>https://github.com/NTParker/Weather-Map-App/issues</a:t>
+            </a:r>
+            <a:endParaRPr lang="en-US" dirty="0"/>
+          </a:p>
+          <a:p>
+            <a:endParaRPr lang="en-US" dirty="0"/>
+          </a:p>
+          <a:p>
+            <a:r>
+              <a:rPr lang="en-US" dirty="0"/>
+              <a:t>https://</a:t>
+            </a:r>
+            <a:r>
+              <a:rPr lang="en-US" dirty="0" err="1"/>
+              <a:t>ntparker.github.io</a:t>
+            </a:r>
+            <a:r>
+              <a:rPr lang="en-US" dirty="0"/>
+              <a:t>/Weather-Map-App/</a:t>
+            </a:r>
+          </a:p>
+          <a:p>
+            <a:endParaRPr lang="en-US" dirty="0"/>
+          </a:p>
+        </p:txBody>
+      </p:sp>
+    </p:spTree>
+    <p:extLst>
+      <p:ext uri="{BB962C8B-B14F-4D97-AF65-F5344CB8AC3E}">
+        <p14:creationId xmlns:p14="http://schemas.microsoft.com/office/powerpoint/2010/main" val="1214871756"/>
+      </p:ext>
+    </p:extLst>
+  </p:cSld>
+  <p:clrMapOvr>
+    <a:masterClrMapping/>
+  </p:clrMapOvr>
+</p:sld>
+</file>
+
+<file path=ppt/slides/slide11.xml><?xml version="1.0" encoding="utf-8"?>
+<p:sld xmlns:a="http://schemas.openxmlformats.org/drawingml/2006/main" xmlns:r="http://schemas.openxmlformats.org/officeDocument/2006/relationships" xmlns:p="http://schemas.openxmlformats.org/presentationml/2006/main">
+  <p:cSld>
+    <p:spTree>
+      <p:nvGrpSpPr>
+        <p:cNvPr id="1" name=""/>
+        <p:cNvGrpSpPr/>
+        <p:nvPr/>
+      </p:nvGrpSpPr>
+      <p:grpSpPr>
+        <a:xfrm>
+          <a:off x="0" y="0"/>
+          <a:ext cx="0" cy="0"/>
+          <a:chOff x="0" y="0"/>
+          <a:chExt cx="0" cy="0"/>
+        </a:xfrm>
+      </p:grpSpPr>
+      <p:sp>
+        <p:nvSpPr>
+          <p:cNvPr id="2" name="Title 1">
+            <a:extLst>
+              <a:ext uri="{FF2B5EF4-FFF2-40B4-BE49-F238E27FC236}">
+                <a16:creationId xmlns:a16="http://schemas.microsoft.com/office/drawing/2014/main" id="{5952C900-E54B-B74C-0216-FA0259EBC0F8}"/>
+              </a:ext>
+            </a:extLst>
+          </p:cNvPr>
+          <p:cNvSpPr>
+            <a:spLocks noGrp="1"/>
+          </p:cNvSpPr>
+          <p:nvPr>
+            <p:ph type="title"/>
+          </p:nvPr>
+        </p:nvSpPr>
+        <p:spPr/>
+        <p:txBody>
+          <a:bodyPr/>
+          <a:lstStyle/>
+          <a:p>
+            <a:r>
+              <a:rPr lang="en-US" dirty="0"/>
+              <a:t>Q &amp; A</a:t>
+            </a:r>
+          </a:p>
+        </p:txBody>
+      </p:sp>
+      <p:sp>
+        <p:nvSpPr>
+          <p:cNvPr id="3" name="Content Placeholder 2">
+            <a:extLst>
+              <a:ext uri="{FF2B5EF4-FFF2-40B4-BE49-F238E27FC236}">
+                <a16:creationId xmlns:a16="http://schemas.microsoft.com/office/drawing/2014/main" id="{ADF7AC21-4627-58A7-A646-6A5DCE4D45A9}"/>
+              </a:ext>
+            </a:extLst>
+          </p:cNvPr>
+          <p:cNvSpPr>
+            <a:spLocks noGrp="1"/>
+          </p:cNvSpPr>
+          <p:nvPr>
+            <p:ph idx="1"/>
+          </p:nvPr>
+        </p:nvSpPr>
+        <p:spPr/>
+        <p:txBody>
+          <a:bodyPr/>
+          <a:lstStyle/>
+          <a:p>
+            <a:r>
+              <a:rPr lang="en-US" dirty="0"/>
+              <a:t>Questions…? </a:t>
+            </a:r>
+          </a:p>
+        </p:txBody>
+      </p:sp>
+    </p:spTree>
+    <p:extLst>
+      <p:ext uri="{BB962C8B-B14F-4D97-AF65-F5344CB8AC3E}">
+        <p14:creationId xmlns:p14="http://schemas.microsoft.com/office/powerpoint/2010/main" val="55113934"/>
       </p:ext>
     </p:extLst>
   </p:cSld>
@@ -13373,6 +13576,36 @@
           </a:p>
         </p:txBody>
       </p:sp>
+      <p:pic>
+        <p:nvPicPr>
+          <p:cNvPr id="5" name="Picture 4" descr="A screenshot of a computer&#10;&#10;Description automatically generated with medium confidence">
+            <a:extLst>
+              <a:ext uri="{FF2B5EF4-FFF2-40B4-BE49-F238E27FC236}">
+                <a16:creationId xmlns:a16="http://schemas.microsoft.com/office/drawing/2014/main" id="{A6283020-CFD4-ADE4-8268-F4C4DA4FBE15}"/>
+              </a:ext>
+            </a:extLst>
+          </p:cNvPr>
+          <p:cNvPicPr>
+            <a:picLocks noChangeAspect="1"/>
+          </p:cNvPicPr>
+          <p:nvPr/>
+        </p:nvPicPr>
+        <p:blipFill>
+          <a:blip r:embed="rId2"/>
+          <a:stretch>
+            <a:fillRect/>
+          </a:stretch>
+        </p:blipFill>
+        <p:spPr>
+          <a:xfrm>
+            <a:off x="707010" y="2535810"/>
+            <a:ext cx="10938338" cy="3949832"/>
+          </a:xfrm>
+          <a:prstGeom prst="rect">
+            <a:avLst/>
+          </a:prstGeom>
+        </p:spPr>
+      </p:pic>
     </p:spTree>
     <p:extLst>
       <p:ext uri="{BB962C8B-B14F-4D97-AF65-F5344CB8AC3E}">
@@ -13997,6 +14230,36 @@
           </a:p>
         </p:txBody>
       </p:sp>
+      <p:pic>
+        <p:nvPicPr>
+          <p:cNvPr id="6" name="Picture 5">
+            <a:extLst>
+              <a:ext uri="{FF2B5EF4-FFF2-40B4-BE49-F238E27FC236}">
+                <a16:creationId xmlns:a16="http://schemas.microsoft.com/office/drawing/2014/main" id="{7CC9F846-FBB1-F7A7-AFFF-195126537349}"/>
+              </a:ext>
+            </a:extLst>
+          </p:cNvPr>
+          <p:cNvPicPr>
+            <a:picLocks noChangeAspect="1"/>
+          </p:cNvPicPr>
+          <p:nvPr/>
+        </p:nvPicPr>
+        <p:blipFill>
+          <a:blip r:embed="rId2"/>
+          <a:stretch>
+            <a:fillRect/>
+          </a:stretch>
+        </p:blipFill>
+        <p:spPr>
+          <a:xfrm>
+            <a:off x="768626" y="2564296"/>
+            <a:ext cx="10807148" cy="3925958"/>
+          </a:xfrm>
+          <a:prstGeom prst="rect">
+            <a:avLst/>
+          </a:prstGeom>
+        </p:spPr>
+      </p:pic>
     </p:spTree>
     <p:extLst>
       <p:ext uri="{BB962C8B-B14F-4D97-AF65-F5344CB8AC3E}">
@@ -14011,6 +14274,304 @@
 </file>
 
 <file path=ppt/slides/slide7.xml><?xml version="1.0" encoding="utf-8"?>
+<p:sld xmlns:a="http://schemas.openxmlformats.org/drawingml/2006/main" xmlns:r="http://schemas.openxmlformats.org/officeDocument/2006/relationships" xmlns:p="http://schemas.openxmlformats.org/presentationml/2006/main">
+  <p:cSld>
+    <p:spTree>
+      <p:nvGrpSpPr>
+        <p:cNvPr id="1" name=""/>
+        <p:cNvGrpSpPr/>
+        <p:nvPr/>
+      </p:nvGrpSpPr>
+      <p:grpSpPr>
+        <a:xfrm>
+          <a:off x="0" y="0"/>
+          <a:ext cx="0" cy="0"/>
+          <a:chOff x="0" y="0"/>
+          <a:chExt cx="0" cy="0"/>
+        </a:xfrm>
+      </p:grpSpPr>
+      <p:sp>
+        <p:nvSpPr>
+          <p:cNvPr id="2" name="Title 1">
+            <a:extLst>
+              <a:ext uri="{FF2B5EF4-FFF2-40B4-BE49-F238E27FC236}">
+                <a16:creationId xmlns:a16="http://schemas.microsoft.com/office/drawing/2014/main" id="{2823A2B7-C5AA-12A2-9A5C-08CA388F1F2C}"/>
+              </a:ext>
+            </a:extLst>
+          </p:cNvPr>
+          <p:cNvSpPr>
+            <a:spLocks noGrp="1"/>
+          </p:cNvSpPr>
+          <p:nvPr>
+            <p:ph type="title"/>
+          </p:nvPr>
+        </p:nvSpPr>
+        <p:spPr/>
+        <p:txBody>
+          <a:bodyPr/>
+          <a:lstStyle/>
+          <a:p>
+            <a:r>
+              <a:rPr lang="en-US" dirty="0"/>
+              <a:t>Demo</a:t>
+            </a:r>
+          </a:p>
+        </p:txBody>
+      </p:sp>
+      <p:sp>
+        <p:nvSpPr>
+          <p:cNvPr id="4" name="Rectangle 3">
+            <a:extLst>
+              <a:ext uri="{FF2B5EF4-FFF2-40B4-BE49-F238E27FC236}">
+                <a16:creationId xmlns:a16="http://schemas.microsoft.com/office/drawing/2014/main" id="{609219BF-302B-C383-4E53-4D3EEB69C302}"/>
+              </a:ext>
+            </a:extLst>
+          </p:cNvPr>
+          <p:cNvSpPr/>
+          <p:nvPr/>
+        </p:nvSpPr>
+        <p:spPr>
+          <a:xfrm>
+            <a:off x="546652" y="2405271"/>
+            <a:ext cx="11251096" cy="4244008"/>
+          </a:xfrm>
+          <a:prstGeom prst="rect">
+            <a:avLst/>
+          </a:prstGeom>
+          <a:solidFill>
+            <a:schemeClr val="tx2">
+              <a:lumMod val="75000"/>
+            </a:schemeClr>
+          </a:solidFill>
+          <a:ln>
+            <a:solidFill>
+              <a:schemeClr val="accent6">
+                <a:lumMod val="75000"/>
+              </a:schemeClr>
+            </a:solidFill>
+          </a:ln>
+        </p:spPr>
+        <p:style>
+          <a:lnRef idx="2">
+            <a:schemeClr val="accent1">
+              <a:shade val="50000"/>
+            </a:schemeClr>
+          </a:lnRef>
+          <a:fillRef idx="1">
+            <a:schemeClr val="accent1"/>
+          </a:fillRef>
+          <a:effectRef idx="0">
+            <a:schemeClr val="accent1"/>
+          </a:effectRef>
+          <a:fontRef idx="minor">
+            <a:schemeClr val="lt1"/>
+          </a:fontRef>
+        </p:style>
+        <p:txBody>
+          <a:bodyPr rtlCol="0" anchor="ctr"/>
+          <a:lstStyle/>
+          <a:p>
+            <a:pPr algn="ctr"/>
+            <a:endParaRPr lang="en-US" dirty="0">
+              <a:hlinkClick r:id="rId2"/>
+            </a:endParaRPr>
+          </a:p>
+          <a:p>
+            <a:pPr algn="ctr"/>
+            <a:endParaRPr lang="en-US" dirty="0"/>
+          </a:p>
+        </p:txBody>
+      </p:sp>
+      <p:pic>
+        <p:nvPicPr>
+          <p:cNvPr id="3" name="Picture 2">
+            <a:extLst>
+              <a:ext uri="{FF2B5EF4-FFF2-40B4-BE49-F238E27FC236}">
+                <a16:creationId xmlns:a16="http://schemas.microsoft.com/office/drawing/2014/main" id="{B103F589-E25D-F340-3DD4-F8BE1428E321}"/>
+              </a:ext>
+            </a:extLst>
+          </p:cNvPr>
+          <p:cNvPicPr>
+            <a:picLocks noChangeAspect="1"/>
+          </p:cNvPicPr>
+          <p:nvPr/>
+        </p:nvPicPr>
+        <p:blipFill>
+          <a:blip r:embed="rId3"/>
+          <a:stretch>
+            <a:fillRect/>
+          </a:stretch>
+        </p:blipFill>
+        <p:spPr>
+          <a:xfrm>
+            <a:off x="720587" y="2842592"/>
+            <a:ext cx="10903226" cy="3266032"/>
+          </a:xfrm>
+          <a:prstGeom prst="rect">
+            <a:avLst/>
+          </a:prstGeom>
+        </p:spPr>
+      </p:pic>
+    </p:spTree>
+    <p:extLst>
+      <p:ext uri="{BB962C8B-B14F-4D97-AF65-F5344CB8AC3E}">
+        <p14:creationId xmlns:p14="http://schemas.microsoft.com/office/powerpoint/2010/main" val="3537711989"/>
+      </p:ext>
+    </p:extLst>
+  </p:cSld>
+  <p:clrMapOvr>
+    <a:masterClrMapping/>
+  </p:clrMapOvr>
+</p:sld>
+</file>
+
+<file path=ppt/slides/slide8.xml><?xml version="1.0" encoding="utf-8"?>
+<p:sld xmlns:a="http://schemas.openxmlformats.org/drawingml/2006/main" xmlns:r="http://schemas.openxmlformats.org/officeDocument/2006/relationships" xmlns:p="http://schemas.openxmlformats.org/presentationml/2006/main">
+  <p:cSld>
+    <p:spTree>
+      <p:nvGrpSpPr>
+        <p:cNvPr id="1" name=""/>
+        <p:cNvGrpSpPr/>
+        <p:nvPr/>
+      </p:nvGrpSpPr>
+      <p:grpSpPr>
+        <a:xfrm>
+          <a:off x="0" y="0"/>
+          <a:ext cx="0" cy="0"/>
+          <a:chOff x="0" y="0"/>
+          <a:chExt cx="0" cy="0"/>
+        </a:xfrm>
+      </p:grpSpPr>
+      <p:sp>
+        <p:nvSpPr>
+          <p:cNvPr id="2" name="Title 1">
+            <a:extLst>
+              <a:ext uri="{FF2B5EF4-FFF2-40B4-BE49-F238E27FC236}">
+                <a16:creationId xmlns:a16="http://schemas.microsoft.com/office/drawing/2014/main" id="{2823A2B7-C5AA-12A2-9A5C-08CA388F1F2C}"/>
+              </a:ext>
+            </a:extLst>
+          </p:cNvPr>
+          <p:cNvSpPr>
+            <a:spLocks noGrp="1"/>
+          </p:cNvSpPr>
+          <p:nvPr>
+            <p:ph type="title"/>
+          </p:nvPr>
+        </p:nvSpPr>
+        <p:spPr/>
+        <p:txBody>
+          <a:bodyPr/>
+          <a:lstStyle/>
+          <a:p>
+            <a:r>
+              <a:rPr lang="en-US" dirty="0"/>
+              <a:t>Demo</a:t>
+            </a:r>
+          </a:p>
+        </p:txBody>
+      </p:sp>
+      <p:sp>
+        <p:nvSpPr>
+          <p:cNvPr id="4" name="Rectangle 3">
+            <a:extLst>
+              <a:ext uri="{FF2B5EF4-FFF2-40B4-BE49-F238E27FC236}">
+                <a16:creationId xmlns:a16="http://schemas.microsoft.com/office/drawing/2014/main" id="{609219BF-302B-C383-4E53-4D3EEB69C302}"/>
+              </a:ext>
+            </a:extLst>
+          </p:cNvPr>
+          <p:cNvSpPr/>
+          <p:nvPr/>
+        </p:nvSpPr>
+        <p:spPr>
+          <a:xfrm>
+            <a:off x="546652" y="2405271"/>
+            <a:ext cx="11251096" cy="4244008"/>
+          </a:xfrm>
+          <a:prstGeom prst="rect">
+            <a:avLst/>
+          </a:prstGeom>
+          <a:solidFill>
+            <a:schemeClr val="tx2">
+              <a:lumMod val="75000"/>
+            </a:schemeClr>
+          </a:solidFill>
+          <a:ln>
+            <a:solidFill>
+              <a:schemeClr val="accent6">
+                <a:lumMod val="75000"/>
+              </a:schemeClr>
+            </a:solidFill>
+          </a:ln>
+        </p:spPr>
+        <p:style>
+          <a:lnRef idx="2">
+            <a:schemeClr val="accent1">
+              <a:shade val="50000"/>
+            </a:schemeClr>
+          </a:lnRef>
+          <a:fillRef idx="1">
+            <a:schemeClr val="accent1"/>
+          </a:fillRef>
+          <a:effectRef idx="0">
+            <a:schemeClr val="accent1"/>
+          </a:effectRef>
+          <a:fontRef idx="minor">
+            <a:schemeClr val="lt1"/>
+          </a:fontRef>
+        </p:style>
+        <p:txBody>
+          <a:bodyPr rtlCol="0" anchor="ctr"/>
+          <a:lstStyle/>
+          <a:p>
+            <a:pPr algn="ctr"/>
+            <a:endParaRPr lang="en-US"/>
+          </a:p>
+        </p:txBody>
+      </p:sp>
+      <p:pic>
+        <p:nvPicPr>
+          <p:cNvPr id="3" name="Picture 2">
+            <a:extLst>
+              <a:ext uri="{FF2B5EF4-FFF2-40B4-BE49-F238E27FC236}">
+                <a16:creationId xmlns:a16="http://schemas.microsoft.com/office/drawing/2014/main" id="{7FCF39AD-5AC2-BD21-21ED-0F817C51A078}"/>
+              </a:ext>
+            </a:extLst>
+          </p:cNvPr>
+          <p:cNvPicPr>
+            <a:picLocks noChangeAspect="1"/>
+          </p:cNvPicPr>
+          <p:nvPr/>
+        </p:nvPicPr>
+        <p:blipFill>
+          <a:blip r:embed="rId2"/>
+          <a:stretch>
+            <a:fillRect/>
+          </a:stretch>
+        </p:blipFill>
+        <p:spPr>
+          <a:xfrm>
+            <a:off x="864704" y="2787220"/>
+            <a:ext cx="10614992" cy="3623520"/>
+          </a:xfrm>
+          <a:prstGeom prst="rect">
+            <a:avLst/>
+          </a:prstGeom>
+        </p:spPr>
+      </p:pic>
+    </p:spTree>
+    <p:extLst>
+      <p:ext uri="{BB962C8B-B14F-4D97-AF65-F5344CB8AC3E}">
+        <p14:creationId xmlns:p14="http://schemas.microsoft.com/office/powerpoint/2010/main" val="3711780614"/>
+      </p:ext>
+    </p:extLst>
+  </p:cSld>
+  <p:clrMapOvr>
+    <a:masterClrMapping/>
+  </p:clrMapOvr>
+</p:sld>
+</file>
+
+<file path=ppt/slides/slide9.xml><?xml version="1.0" encoding="utf-8"?>
 <p:sld xmlns:a="http://schemas.openxmlformats.org/drawingml/2006/main" xmlns:r="http://schemas.openxmlformats.org/officeDocument/2006/relationships" xmlns:p="http://schemas.openxmlformats.org/presentationml/2006/main">
   <p:cSld>
     <p:spTree>
@@ -14108,115 +14669,6 @@
     <p:extLst>
       <p:ext uri="{BB962C8B-B14F-4D97-AF65-F5344CB8AC3E}">
         <p14:creationId xmlns:p14="http://schemas.microsoft.com/office/powerpoint/2010/main" val="1865679464"/>
-      </p:ext>
-    </p:extLst>
-  </p:cSld>
-  <p:clrMapOvr>
-    <a:masterClrMapping/>
-  </p:clrMapOvr>
-</p:sld>
-</file>
-
-<file path=ppt/slides/slide8.xml><?xml version="1.0" encoding="utf-8"?>
-<p:sld xmlns:a="http://schemas.openxmlformats.org/drawingml/2006/main" xmlns:r="http://schemas.openxmlformats.org/officeDocument/2006/relationships" xmlns:p="http://schemas.openxmlformats.org/presentationml/2006/main">
-  <p:cSld>
-    <p:spTree>
-      <p:nvGrpSpPr>
-        <p:cNvPr id="1" name=""/>
-        <p:cNvGrpSpPr/>
-        <p:nvPr/>
-      </p:nvGrpSpPr>
-      <p:grpSpPr>
-        <a:xfrm>
-          <a:off x="0" y="0"/>
-          <a:ext cx="0" cy="0"/>
-          <a:chOff x="0" y="0"/>
-          <a:chExt cx="0" cy="0"/>
-        </a:xfrm>
-      </p:grpSpPr>
-      <p:sp>
-        <p:nvSpPr>
-          <p:cNvPr id="2" name="Title 1">
-            <a:extLst>
-              <a:ext uri="{FF2B5EF4-FFF2-40B4-BE49-F238E27FC236}">
-                <a16:creationId xmlns:a16="http://schemas.microsoft.com/office/drawing/2014/main" id="{E726FAA5-6E55-7076-24A5-3C70992FDBFD}"/>
-              </a:ext>
-            </a:extLst>
-          </p:cNvPr>
-          <p:cNvSpPr>
-            <a:spLocks noGrp="1"/>
-          </p:cNvSpPr>
-          <p:nvPr>
-            <p:ph type="title"/>
-          </p:nvPr>
-        </p:nvSpPr>
-        <p:spPr/>
-        <p:txBody>
-          <a:bodyPr/>
-          <a:lstStyle/>
-          <a:p>
-            <a:r>
-              <a:rPr lang="en-US" dirty="0"/>
-              <a:t>Links </a:t>
-            </a:r>
-          </a:p>
-        </p:txBody>
-      </p:sp>
-      <p:sp>
-        <p:nvSpPr>
-          <p:cNvPr id="3" name="Content Placeholder 2">
-            <a:extLst>
-              <a:ext uri="{FF2B5EF4-FFF2-40B4-BE49-F238E27FC236}">
-                <a16:creationId xmlns:a16="http://schemas.microsoft.com/office/drawing/2014/main" id="{AF2683F6-26D8-FFDB-6C9E-F83EDA87098E}"/>
-              </a:ext>
-            </a:extLst>
-          </p:cNvPr>
-          <p:cNvSpPr>
-            <a:spLocks noGrp="1"/>
-          </p:cNvSpPr>
-          <p:nvPr>
-            <p:ph idx="1"/>
-          </p:nvPr>
-        </p:nvSpPr>
-        <p:spPr/>
-        <p:txBody>
-          <a:bodyPr/>
-          <a:lstStyle/>
-          <a:p>
-            <a:r>
-              <a:rPr lang="en-US" dirty="0">
-                <a:hlinkClick r:id="rId2"/>
-              </a:rPr>
-              <a:t>https://github.com/NTParker/Weather-Map-App/issues</a:t>
-            </a:r>
-            <a:endParaRPr lang="en-US" dirty="0"/>
-          </a:p>
-          <a:p>
-            <a:endParaRPr lang="en-US" dirty="0"/>
-          </a:p>
-          <a:p>
-            <a:r>
-              <a:rPr lang="en-US" dirty="0"/>
-              <a:t>https://</a:t>
-            </a:r>
-            <a:r>
-              <a:rPr lang="en-US" dirty="0" err="1"/>
-              <a:t>ntparker.github.io</a:t>
-            </a:r>
-            <a:r>
-              <a:rPr lang="en-US" dirty="0"/>
-              <a:t>/Weather-Map-App/</a:t>
-            </a:r>
-          </a:p>
-          <a:p>
-            <a:endParaRPr lang="en-US" dirty="0"/>
-          </a:p>
-        </p:txBody>
-      </p:sp>
-    </p:spTree>
-    <p:extLst>
-      <p:ext uri="{BB962C8B-B14F-4D97-AF65-F5344CB8AC3E}">
-        <p14:creationId xmlns:p14="http://schemas.microsoft.com/office/powerpoint/2010/main" val="1214871756"/>
       </p:ext>
     </p:extLst>
   </p:cSld>

</xml_diff>